<commit_message>
Added intermidiate values to aggregations
</commit_message>
<xml_diff>
--- a/docs/presentations/Data Processing System (Oct 16 2020 Update).pptx
+++ b/docs/presentations/Data Processing System (Oct 16 2020 Update).pptx
@@ -5,19 +5,20 @@
     <p:sldMasterId id="2147483648" r:id="rId4"/>
   </p:sldMasterIdLst>
   <p:notesMasterIdLst>
-    <p:notesMasterId r:id="rId15"/>
+    <p:notesMasterId r:id="rId16"/>
   </p:notesMasterIdLst>
   <p:sldIdLst>
     <p:sldId id="256" r:id="rId5"/>
     <p:sldId id="257" r:id="rId6"/>
-    <p:sldId id="258" r:id="rId7"/>
-    <p:sldId id="275" r:id="rId8"/>
-    <p:sldId id="278" r:id="rId9"/>
-    <p:sldId id="277" r:id="rId10"/>
-    <p:sldId id="279" r:id="rId11"/>
-    <p:sldId id="280" r:id="rId12"/>
-    <p:sldId id="281" r:id="rId13"/>
-    <p:sldId id="274" r:id="rId14"/>
+    <p:sldId id="282" r:id="rId7"/>
+    <p:sldId id="258" r:id="rId8"/>
+    <p:sldId id="275" r:id="rId9"/>
+    <p:sldId id="278" r:id="rId10"/>
+    <p:sldId id="277" r:id="rId11"/>
+    <p:sldId id="279" r:id="rId12"/>
+    <p:sldId id="280" r:id="rId13"/>
+    <p:sldId id="281" r:id="rId14"/>
+    <p:sldId id="274" r:id="rId15"/>
   </p:sldIdLst>
   <p:sldSz cx="12192000" cy="6858000"/>
   <p:notesSz cx="6858000" cy="9144000"/>
@@ -3811,15 +3812,15 @@
           <p:cNvPr id="2" name="Title 1">
             <a:extLst>
               <a:ext uri="{FF2B5EF4-FFF2-40B4-BE49-F238E27FC236}">
-                <a16:creationId xmlns:a16="http://schemas.microsoft.com/office/drawing/2014/main" id="{DC557193-60D1-4187-84CE-BA4E29F1B28E}"/>
-              </a:ext>
-            </a:extLst>
-          </p:cNvPr>
-          <p:cNvSpPr>
-            <a:spLocks noGrp="1"/>
-          </p:cNvSpPr>
-          <p:nvPr>
-            <p:ph type="ctrTitle"/>
+                <a16:creationId xmlns:a16="http://schemas.microsoft.com/office/drawing/2014/main" id="{C02741FD-9F10-4244-BF1E-B63E9B7FD562}"/>
+              </a:ext>
+            </a:extLst>
+          </p:cNvPr>
+          <p:cNvSpPr>
+            <a:spLocks noGrp="1"/>
+          </p:cNvSpPr>
+          <p:nvPr>
+            <p:ph type="title"/>
           </p:nvPr>
         </p:nvSpPr>
         <p:spPr/>
@@ -3829,17 +3830,17 @@
           <a:p>
             <a:r>
               <a:rPr lang="en-US" dirty="0"/>
-              <a:t>Questions</a:t>
-            </a:r>
-          </a:p>
-        </p:txBody>
-      </p:sp>
-      <p:sp>
-        <p:nvSpPr>
-          <p:cNvPr id="6" name="Slide Number Placeholder 5">
-            <a:extLst>
-              <a:ext uri="{FF2B5EF4-FFF2-40B4-BE49-F238E27FC236}">
-                <a16:creationId xmlns:a16="http://schemas.microsoft.com/office/drawing/2014/main" id="{E5734232-AFAE-40CE-8100-EF7B3335EB21}"/>
+              <a:t>DPS UI – End-User Interface – Batch Process</a:t>
+            </a:r>
+          </a:p>
+        </p:txBody>
+      </p:sp>
+      <p:sp>
+        <p:nvSpPr>
+          <p:cNvPr id="5" name="Slide Number Placeholder 4">
+            <a:extLst>
+              <a:ext uri="{FF2B5EF4-FFF2-40B4-BE49-F238E27FC236}">
+                <a16:creationId xmlns:a16="http://schemas.microsoft.com/office/drawing/2014/main" id="{445AB3A0-5122-4EEB-A97B-D0F5BDBF509D}"/>
               </a:ext>
             </a:extLst>
           </p:cNvPr>
@@ -3858,6 +3859,123 @@
             <a:fld id="{272CAA4E-1DDD-451B-A02B-C4FCBD1FBAB6}" type="slidenum">
               <a:rPr lang="en-US" smtClean="0"/>
               <a:t>10</a:t>
+            </a:fld>
+            <a:endParaRPr lang="en-US"/>
+          </a:p>
+        </p:txBody>
+      </p:sp>
+      <p:pic>
+        <p:nvPicPr>
+          <p:cNvPr id="4" name="Picture 3">
+            <a:extLst>
+              <a:ext uri="{FF2B5EF4-FFF2-40B4-BE49-F238E27FC236}">
+                <a16:creationId xmlns:a16="http://schemas.microsoft.com/office/drawing/2014/main" id="{F07026C7-145F-4D4B-8DEB-659351E79E03}"/>
+              </a:ext>
+            </a:extLst>
+          </p:cNvPr>
+          <p:cNvPicPr>
+            <a:picLocks noChangeAspect="1"/>
+          </p:cNvPicPr>
+          <p:nvPr/>
+        </p:nvPicPr>
+        <p:blipFill>
+          <a:blip r:embed="rId2"/>
+          <a:stretch>
+            <a:fillRect/>
+          </a:stretch>
+        </p:blipFill>
+        <p:spPr>
+          <a:xfrm>
+            <a:off x="642957" y="2032514"/>
+            <a:ext cx="10906086" cy="3927653"/>
+          </a:xfrm>
+          <a:prstGeom prst="rect">
+            <a:avLst/>
+          </a:prstGeom>
+        </p:spPr>
+      </p:pic>
+    </p:spTree>
+    <p:extLst>
+      <p:ext uri="{BB962C8B-B14F-4D97-AF65-F5344CB8AC3E}">
+        <p14:creationId xmlns:p14="http://schemas.microsoft.com/office/powerpoint/2010/main" val="194762061"/>
+      </p:ext>
+    </p:extLst>
+  </p:cSld>
+  <p:clrMapOvr>
+    <a:masterClrMapping/>
+  </p:clrMapOvr>
+</p:sld>
+</file>
+
+<file path=ppt/slides/slide11.xml><?xml version="1.0" encoding="utf-8"?>
+<p:sld xmlns:a="http://schemas.openxmlformats.org/drawingml/2006/main" xmlns:r="http://schemas.openxmlformats.org/officeDocument/2006/relationships" xmlns:p="http://schemas.openxmlformats.org/presentationml/2006/main">
+  <p:cSld>
+    <p:spTree>
+      <p:nvGrpSpPr>
+        <p:cNvPr id="1" name=""/>
+        <p:cNvGrpSpPr/>
+        <p:nvPr/>
+      </p:nvGrpSpPr>
+      <p:grpSpPr>
+        <a:xfrm>
+          <a:off x="0" y="0"/>
+          <a:ext cx="0" cy="0"/>
+          <a:chOff x="0" y="0"/>
+          <a:chExt cx="0" cy="0"/>
+        </a:xfrm>
+      </p:grpSpPr>
+      <p:sp>
+        <p:nvSpPr>
+          <p:cNvPr id="2" name="Title 1">
+            <a:extLst>
+              <a:ext uri="{FF2B5EF4-FFF2-40B4-BE49-F238E27FC236}">
+                <a16:creationId xmlns:a16="http://schemas.microsoft.com/office/drawing/2014/main" id="{DC557193-60D1-4187-84CE-BA4E29F1B28E}"/>
+              </a:ext>
+            </a:extLst>
+          </p:cNvPr>
+          <p:cNvSpPr>
+            <a:spLocks noGrp="1"/>
+          </p:cNvSpPr>
+          <p:nvPr>
+            <p:ph type="ctrTitle"/>
+          </p:nvPr>
+        </p:nvSpPr>
+        <p:spPr/>
+        <p:txBody>
+          <a:bodyPr/>
+          <a:lstStyle/>
+          <a:p>
+            <a:r>
+              <a:rPr lang="en-US" dirty="0"/>
+              <a:t>Questions</a:t>
+            </a:r>
+          </a:p>
+        </p:txBody>
+      </p:sp>
+      <p:sp>
+        <p:nvSpPr>
+          <p:cNvPr id="6" name="Slide Number Placeholder 5">
+            <a:extLst>
+              <a:ext uri="{FF2B5EF4-FFF2-40B4-BE49-F238E27FC236}">
+                <a16:creationId xmlns:a16="http://schemas.microsoft.com/office/drawing/2014/main" id="{E5734232-AFAE-40CE-8100-EF7B3335EB21}"/>
+              </a:ext>
+            </a:extLst>
+          </p:cNvPr>
+          <p:cNvSpPr>
+            <a:spLocks noGrp="1"/>
+          </p:cNvSpPr>
+          <p:nvPr>
+            <p:ph type="sldNum" sz="quarter" idx="12"/>
+          </p:nvPr>
+        </p:nvSpPr>
+        <p:spPr/>
+        <p:txBody>
+          <a:bodyPr/>
+          <a:lstStyle/>
+          <a:p>
+            <a:fld id="{272CAA4E-1DDD-451B-A02B-C4FCBD1FBAB6}" type="slidenum">
+              <a:rPr lang="en-US" smtClean="0"/>
+              <a:t>11</a:t>
             </a:fld>
             <a:endParaRPr lang="en-US"/>
           </a:p>
@@ -3971,27 +4089,130 @@
       </p:sp>
       <p:sp>
         <p:nvSpPr>
-          <p:cNvPr id="4" name="Slide Number Placeholder 3">
-            <a:extLst>
-              <a:ext uri="{FF2B5EF4-FFF2-40B4-BE49-F238E27FC236}">
-                <a16:creationId xmlns:a16="http://schemas.microsoft.com/office/drawing/2014/main" id="{5D7EF5BE-E74D-4CE5-B81D-E268F553CD47}"/>
-              </a:ext>
-            </a:extLst>
-          </p:cNvPr>
-          <p:cNvSpPr>
-            <a:spLocks noGrp="1"/>
-          </p:cNvSpPr>
-          <p:nvPr>
-            <p:ph type="sldNum" sz="quarter" idx="12"/>
-          </p:nvPr>
-        </p:nvSpPr>
-        <p:spPr/>
-        <p:txBody>
-          <a:bodyPr/>
-          <a:lstStyle/>
+          <p:cNvPr id="7" name="Slide Number Placeholder 7">
+            <a:extLst>
+              <a:ext uri="{FF2B5EF4-FFF2-40B4-BE49-F238E27FC236}">
+                <a16:creationId xmlns:a16="http://schemas.microsoft.com/office/drawing/2014/main" id="{F80C96EE-57DA-426E-82A6-CF8710D430BE}"/>
+              </a:ext>
+            </a:extLst>
+          </p:cNvPr>
+          <p:cNvSpPr txBox="1">
+            <a:spLocks/>
+          </p:cNvSpPr>
+          <p:nvPr/>
+        </p:nvSpPr>
+        <p:spPr>
+          <a:xfrm>
+            <a:off x="8763000" y="6508750"/>
+            <a:ext cx="2743200" cy="365125"/>
+          </a:xfrm>
+          <a:prstGeom prst="rect">
+            <a:avLst/>
+          </a:prstGeom>
+        </p:spPr>
+        <p:txBody>
+          <a:bodyPr vert="horz" lIns="91440" tIns="45720" rIns="91440" bIns="45720" rtlCol="0" anchor="ctr"/>
+          <a:lstStyle>
+            <a:defPPr>
+              <a:defRPr lang="en-US"/>
+            </a:defPPr>
+            <a:lvl1pPr marL="0" algn="r" defTabSz="914400" rtl="0" eaLnBrk="1" latinLnBrk="0" hangingPunct="1">
+              <a:defRPr sz="1200" kern="1200">
+                <a:solidFill>
+                  <a:schemeClr val="tx1">
+                    <a:tint val="75000"/>
+                  </a:schemeClr>
+                </a:solidFill>
+                <a:latin typeface="+mn-lt"/>
+                <a:ea typeface="+mn-ea"/>
+                <a:cs typeface="+mn-cs"/>
+              </a:defRPr>
+            </a:lvl1pPr>
+            <a:lvl2pPr marL="457200" algn="l" defTabSz="914400" rtl="0" eaLnBrk="1" latinLnBrk="0" hangingPunct="1">
+              <a:defRPr sz="1800" kern="1200">
+                <a:solidFill>
+                  <a:schemeClr val="tx1"/>
+                </a:solidFill>
+                <a:latin typeface="+mn-lt"/>
+                <a:ea typeface="+mn-ea"/>
+                <a:cs typeface="+mn-cs"/>
+              </a:defRPr>
+            </a:lvl2pPr>
+            <a:lvl3pPr marL="914400" algn="l" defTabSz="914400" rtl="0" eaLnBrk="1" latinLnBrk="0" hangingPunct="1">
+              <a:defRPr sz="1800" kern="1200">
+                <a:solidFill>
+                  <a:schemeClr val="tx1"/>
+                </a:solidFill>
+                <a:latin typeface="+mn-lt"/>
+                <a:ea typeface="+mn-ea"/>
+                <a:cs typeface="+mn-cs"/>
+              </a:defRPr>
+            </a:lvl3pPr>
+            <a:lvl4pPr marL="1371600" algn="l" defTabSz="914400" rtl="0" eaLnBrk="1" latinLnBrk="0" hangingPunct="1">
+              <a:defRPr sz="1800" kern="1200">
+                <a:solidFill>
+                  <a:schemeClr val="tx1"/>
+                </a:solidFill>
+                <a:latin typeface="+mn-lt"/>
+                <a:ea typeface="+mn-ea"/>
+                <a:cs typeface="+mn-cs"/>
+              </a:defRPr>
+            </a:lvl4pPr>
+            <a:lvl5pPr marL="1828800" algn="l" defTabSz="914400" rtl="0" eaLnBrk="1" latinLnBrk="0" hangingPunct="1">
+              <a:defRPr sz="1800" kern="1200">
+                <a:solidFill>
+                  <a:schemeClr val="tx1"/>
+                </a:solidFill>
+                <a:latin typeface="+mn-lt"/>
+                <a:ea typeface="+mn-ea"/>
+                <a:cs typeface="+mn-cs"/>
+              </a:defRPr>
+            </a:lvl5pPr>
+            <a:lvl6pPr marL="2286000" algn="l" defTabSz="914400" rtl="0" eaLnBrk="1" latinLnBrk="0" hangingPunct="1">
+              <a:defRPr sz="1800" kern="1200">
+                <a:solidFill>
+                  <a:schemeClr val="tx1"/>
+                </a:solidFill>
+                <a:latin typeface="+mn-lt"/>
+                <a:ea typeface="+mn-ea"/>
+                <a:cs typeface="+mn-cs"/>
+              </a:defRPr>
+            </a:lvl6pPr>
+            <a:lvl7pPr marL="2743200" algn="l" defTabSz="914400" rtl="0" eaLnBrk="1" latinLnBrk="0" hangingPunct="1">
+              <a:defRPr sz="1800" kern="1200">
+                <a:solidFill>
+                  <a:schemeClr val="tx1"/>
+                </a:solidFill>
+                <a:latin typeface="+mn-lt"/>
+                <a:ea typeface="+mn-ea"/>
+                <a:cs typeface="+mn-cs"/>
+              </a:defRPr>
+            </a:lvl7pPr>
+            <a:lvl8pPr marL="3200400" algn="l" defTabSz="914400" rtl="0" eaLnBrk="1" latinLnBrk="0" hangingPunct="1">
+              <a:defRPr sz="1800" kern="1200">
+                <a:solidFill>
+                  <a:schemeClr val="tx1"/>
+                </a:solidFill>
+                <a:latin typeface="+mn-lt"/>
+                <a:ea typeface="+mn-ea"/>
+                <a:cs typeface="+mn-cs"/>
+              </a:defRPr>
+            </a:lvl8pPr>
+            <a:lvl9pPr marL="3657600" algn="l" defTabSz="914400" rtl="0" eaLnBrk="1" latinLnBrk="0" hangingPunct="1">
+              <a:defRPr sz="1800" kern="1200">
+                <a:solidFill>
+                  <a:schemeClr val="tx1"/>
+                </a:solidFill>
+                <a:latin typeface="+mn-lt"/>
+                <a:ea typeface="+mn-ea"/>
+                <a:cs typeface="+mn-cs"/>
+              </a:defRPr>
+            </a:lvl9pPr>
+          </a:lstStyle>
           <a:p>
             <a:fld id="{272CAA4E-1DDD-451B-A02B-C4FCBD1FBAB6}" type="slidenum">
               <a:rPr lang="en-US" smtClean="0"/>
+              <a:pPr/>
               <a:t>2</a:t>
             </a:fld>
             <a:endParaRPr lang="en-US"/>
@@ -4028,6 +4249,284 @@
           <a:chExt cx="0" cy="0"/>
         </a:xfrm>
       </p:grpSpPr>
+      <p:pic>
+        <p:nvPicPr>
+          <p:cNvPr id="5" name="Picture 4" descr="Diagram&#10;&#10;Description automatically generated">
+            <a:extLst>
+              <a:ext uri="{FF2B5EF4-FFF2-40B4-BE49-F238E27FC236}">
+                <a16:creationId xmlns:a16="http://schemas.microsoft.com/office/drawing/2014/main" id="{DEE0F134-D40D-4147-8D8C-48BC6D7DCC5C}"/>
+              </a:ext>
+            </a:extLst>
+          </p:cNvPr>
+          <p:cNvPicPr>
+            <a:picLocks noChangeAspect="1"/>
+          </p:cNvPicPr>
+          <p:nvPr/>
+        </p:nvPicPr>
+        <p:blipFill>
+          <a:blip r:embed="rId2">
+            <a:extLst>
+              <a:ext uri="{28A0092B-C50C-407E-A947-70E740481C1C}">
+                <a14:useLocalDpi xmlns:a14="http://schemas.microsoft.com/office/drawing/2010/main" val="0"/>
+              </a:ext>
+            </a:extLst>
+          </a:blip>
+          <a:stretch>
+            <a:fillRect/>
+          </a:stretch>
+        </p:blipFill>
+        <p:spPr>
+          <a:xfrm>
+            <a:off x="1909490" y="1817468"/>
+            <a:ext cx="8986999" cy="4323291"/>
+          </a:xfrm>
+          <a:prstGeom prst="rect">
+            <a:avLst/>
+          </a:prstGeom>
+        </p:spPr>
+      </p:pic>
+      <p:sp>
+        <p:nvSpPr>
+          <p:cNvPr id="6" name="Oval 5">
+            <a:extLst>
+              <a:ext uri="{FF2B5EF4-FFF2-40B4-BE49-F238E27FC236}">
+                <a16:creationId xmlns:a16="http://schemas.microsoft.com/office/drawing/2014/main" id="{E832CA03-358A-494C-948A-47D0FA0D3D46}"/>
+              </a:ext>
+            </a:extLst>
+          </p:cNvPr>
+          <p:cNvSpPr/>
+          <p:nvPr/>
+        </p:nvSpPr>
+        <p:spPr>
+          <a:xfrm>
+            <a:off x="7531586" y="3695855"/>
+            <a:ext cx="2794000" cy="1619250"/>
+          </a:xfrm>
+          <a:prstGeom prst="ellipse">
+            <a:avLst/>
+          </a:prstGeom>
+          <a:noFill/>
+          <a:ln>
+            <a:solidFill>
+              <a:srgbClr val="C00000"/>
+            </a:solidFill>
+          </a:ln>
+        </p:spPr>
+        <p:style>
+          <a:lnRef idx="2">
+            <a:schemeClr val="accent1">
+              <a:shade val="50000"/>
+            </a:schemeClr>
+          </a:lnRef>
+          <a:fillRef idx="1">
+            <a:schemeClr val="accent1"/>
+          </a:fillRef>
+          <a:effectRef idx="0">
+            <a:schemeClr val="accent1"/>
+          </a:effectRef>
+          <a:fontRef idx="minor">
+            <a:schemeClr val="lt1"/>
+          </a:fontRef>
+        </p:style>
+        <p:txBody>
+          <a:bodyPr rtlCol="0" anchor="ctr"/>
+          <a:lstStyle/>
+          <a:p>
+            <a:pPr algn="ctr"/>
+            <a:endParaRPr lang="en-US"/>
+          </a:p>
+        </p:txBody>
+      </p:sp>
+      <p:sp>
+        <p:nvSpPr>
+          <p:cNvPr id="2" name="Title 1">
+            <a:extLst>
+              <a:ext uri="{FF2B5EF4-FFF2-40B4-BE49-F238E27FC236}">
+                <a16:creationId xmlns:a16="http://schemas.microsoft.com/office/drawing/2014/main" id="{CEADFE7D-5377-4273-93BA-482362FC325B}"/>
+              </a:ext>
+            </a:extLst>
+          </p:cNvPr>
+          <p:cNvSpPr>
+            <a:spLocks noGrp="1"/>
+          </p:cNvSpPr>
+          <p:nvPr>
+            <p:ph type="title"/>
+          </p:nvPr>
+        </p:nvSpPr>
+        <p:spPr/>
+        <p:txBody>
+          <a:bodyPr/>
+          <a:lstStyle/>
+          <a:p>
+            <a:r>
+              <a:rPr lang="en-US" dirty="0"/>
+              <a:t>Overview</a:t>
+            </a:r>
+          </a:p>
+        </p:txBody>
+      </p:sp>
+      <p:sp>
+        <p:nvSpPr>
+          <p:cNvPr id="7" name="Slide Number Placeholder 7">
+            <a:extLst>
+              <a:ext uri="{FF2B5EF4-FFF2-40B4-BE49-F238E27FC236}">
+                <a16:creationId xmlns:a16="http://schemas.microsoft.com/office/drawing/2014/main" id="{F80C96EE-57DA-426E-82A6-CF8710D430BE}"/>
+              </a:ext>
+            </a:extLst>
+          </p:cNvPr>
+          <p:cNvSpPr txBox="1">
+            <a:spLocks/>
+          </p:cNvSpPr>
+          <p:nvPr/>
+        </p:nvSpPr>
+        <p:spPr>
+          <a:xfrm>
+            <a:off x="8763000" y="6508750"/>
+            <a:ext cx="2743200" cy="365125"/>
+          </a:xfrm>
+          <a:prstGeom prst="rect">
+            <a:avLst/>
+          </a:prstGeom>
+        </p:spPr>
+        <p:txBody>
+          <a:bodyPr vert="horz" lIns="91440" tIns="45720" rIns="91440" bIns="45720" rtlCol="0" anchor="ctr"/>
+          <a:lstStyle>
+            <a:defPPr>
+              <a:defRPr lang="en-US"/>
+            </a:defPPr>
+            <a:lvl1pPr marL="0" algn="r" defTabSz="914400" rtl="0" eaLnBrk="1" latinLnBrk="0" hangingPunct="1">
+              <a:defRPr sz="1200" kern="1200">
+                <a:solidFill>
+                  <a:schemeClr val="tx1">
+                    <a:tint val="75000"/>
+                  </a:schemeClr>
+                </a:solidFill>
+                <a:latin typeface="+mn-lt"/>
+                <a:ea typeface="+mn-ea"/>
+                <a:cs typeface="+mn-cs"/>
+              </a:defRPr>
+            </a:lvl1pPr>
+            <a:lvl2pPr marL="457200" algn="l" defTabSz="914400" rtl="0" eaLnBrk="1" latinLnBrk="0" hangingPunct="1">
+              <a:defRPr sz="1800" kern="1200">
+                <a:solidFill>
+                  <a:schemeClr val="tx1"/>
+                </a:solidFill>
+                <a:latin typeface="+mn-lt"/>
+                <a:ea typeface="+mn-ea"/>
+                <a:cs typeface="+mn-cs"/>
+              </a:defRPr>
+            </a:lvl2pPr>
+            <a:lvl3pPr marL="914400" algn="l" defTabSz="914400" rtl="0" eaLnBrk="1" latinLnBrk="0" hangingPunct="1">
+              <a:defRPr sz="1800" kern="1200">
+                <a:solidFill>
+                  <a:schemeClr val="tx1"/>
+                </a:solidFill>
+                <a:latin typeface="+mn-lt"/>
+                <a:ea typeface="+mn-ea"/>
+                <a:cs typeface="+mn-cs"/>
+              </a:defRPr>
+            </a:lvl3pPr>
+            <a:lvl4pPr marL="1371600" algn="l" defTabSz="914400" rtl="0" eaLnBrk="1" latinLnBrk="0" hangingPunct="1">
+              <a:defRPr sz="1800" kern="1200">
+                <a:solidFill>
+                  <a:schemeClr val="tx1"/>
+                </a:solidFill>
+                <a:latin typeface="+mn-lt"/>
+                <a:ea typeface="+mn-ea"/>
+                <a:cs typeface="+mn-cs"/>
+              </a:defRPr>
+            </a:lvl4pPr>
+            <a:lvl5pPr marL="1828800" algn="l" defTabSz="914400" rtl="0" eaLnBrk="1" latinLnBrk="0" hangingPunct="1">
+              <a:defRPr sz="1800" kern="1200">
+                <a:solidFill>
+                  <a:schemeClr val="tx1"/>
+                </a:solidFill>
+                <a:latin typeface="+mn-lt"/>
+                <a:ea typeface="+mn-ea"/>
+                <a:cs typeface="+mn-cs"/>
+              </a:defRPr>
+            </a:lvl5pPr>
+            <a:lvl6pPr marL="2286000" algn="l" defTabSz="914400" rtl="0" eaLnBrk="1" latinLnBrk="0" hangingPunct="1">
+              <a:defRPr sz="1800" kern="1200">
+                <a:solidFill>
+                  <a:schemeClr val="tx1"/>
+                </a:solidFill>
+                <a:latin typeface="+mn-lt"/>
+                <a:ea typeface="+mn-ea"/>
+                <a:cs typeface="+mn-cs"/>
+              </a:defRPr>
+            </a:lvl6pPr>
+            <a:lvl7pPr marL="2743200" algn="l" defTabSz="914400" rtl="0" eaLnBrk="1" latinLnBrk="0" hangingPunct="1">
+              <a:defRPr sz="1800" kern="1200">
+                <a:solidFill>
+                  <a:schemeClr val="tx1"/>
+                </a:solidFill>
+                <a:latin typeface="+mn-lt"/>
+                <a:ea typeface="+mn-ea"/>
+                <a:cs typeface="+mn-cs"/>
+              </a:defRPr>
+            </a:lvl7pPr>
+            <a:lvl8pPr marL="3200400" algn="l" defTabSz="914400" rtl="0" eaLnBrk="1" latinLnBrk="0" hangingPunct="1">
+              <a:defRPr sz="1800" kern="1200">
+                <a:solidFill>
+                  <a:schemeClr val="tx1"/>
+                </a:solidFill>
+                <a:latin typeface="+mn-lt"/>
+                <a:ea typeface="+mn-ea"/>
+                <a:cs typeface="+mn-cs"/>
+              </a:defRPr>
+            </a:lvl8pPr>
+            <a:lvl9pPr marL="3657600" algn="l" defTabSz="914400" rtl="0" eaLnBrk="1" latinLnBrk="0" hangingPunct="1">
+              <a:defRPr sz="1800" kern="1200">
+                <a:solidFill>
+                  <a:schemeClr val="tx1"/>
+                </a:solidFill>
+                <a:latin typeface="+mn-lt"/>
+                <a:ea typeface="+mn-ea"/>
+                <a:cs typeface="+mn-cs"/>
+              </a:defRPr>
+            </a:lvl9pPr>
+          </a:lstStyle>
+          <a:p>
+            <a:fld id="{272CAA4E-1DDD-451B-A02B-C4FCBD1FBAB6}" type="slidenum">
+              <a:rPr lang="en-US" smtClean="0"/>
+              <a:pPr/>
+              <a:t>3</a:t>
+            </a:fld>
+            <a:endParaRPr lang="en-US"/>
+          </a:p>
+        </p:txBody>
+      </p:sp>
+    </p:spTree>
+    <p:extLst>
+      <p:ext uri="{BB962C8B-B14F-4D97-AF65-F5344CB8AC3E}">
+        <p14:creationId xmlns:p14="http://schemas.microsoft.com/office/powerpoint/2010/main" val="1060158909"/>
+      </p:ext>
+    </p:extLst>
+  </p:cSld>
+  <p:clrMapOvr>
+    <a:masterClrMapping/>
+  </p:clrMapOvr>
+</p:sld>
+</file>
+
+<file path=ppt/slides/slide4.xml><?xml version="1.0" encoding="utf-8"?>
+<p:sld xmlns:a="http://schemas.openxmlformats.org/drawingml/2006/main" xmlns:r="http://schemas.openxmlformats.org/officeDocument/2006/relationships" xmlns:p="http://schemas.openxmlformats.org/presentationml/2006/main">
+  <p:cSld>
+    <p:spTree>
+      <p:nvGrpSpPr>
+        <p:cNvPr id="1" name=""/>
+        <p:cNvGrpSpPr/>
+        <p:nvPr/>
+      </p:nvGrpSpPr>
+      <p:grpSpPr>
+        <a:xfrm>
+          <a:off x="0" y="0"/>
+          <a:ext cx="0" cy="0"/>
+          <a:chOff x="0" y="0"/>
+          <a:chExt cx="0" cy="0"/>
+        </a:xfrm>
+      </p:grpSpPr>
       <p:sp>
         <p:nvSpPr>
           <p:cNvPr id="2" name="Title 1">
@@ -4079,7 +4578,7 @@
           <a:p>
             <a:fld id="{272CAA4E-1DDD-451B-A02B-C4FCBD1FBAB6}" type="slidenum">
               <a:rPr lang="en-US" smtClean="0"/>
-              <a:t>3</a:t>
+              <a:t>4</a:t>
             </a:fld>
             <a:endParaRPr lang="en-US"/>
           </a:p>
@@ -4128,7 +4627,7 @@
 </p:sld>
 </file>
 
-<file path=ppt/slides/slide4.xml><?xml version="1.0" encoding="utf-8"?>
+<file path=ppt/slides/slide5.xml><?xml version="1.0" encoding="utf-8"?>
 <p:sld xmlns:a="http://schemas.openxmlformats.org/drawingml/2006/main" xmlns:r="http://schemas.openxmlformats.org/officeDocument/2006/relationships" xmlns:p="http://schemas.openxmlformats.org/presentationml/2006/main">
   <p:cSld>
     <p:spTree>
@@ -4196,7 +4695,7 @@
           <a:p>
             <a:fld id="{272CAA4E-1DDD-451B-A02B-C4FCBD1FBAB6}" type="slidenum">
               <a:rPr lang="en-US" smtClean="0"/>
-              <a:t>4</a:t>
+              <a:t>5</a:t>
             </a:fld>
             <a:endParaRPr lang="en-US"/>
           </a:p>
@@ -4245,7 +4744,7 @@
 </p:sld>
 </file>
 
-<file path=ppt/slides/slide5.xml><?xml version="1.0" encoding="utf-8"?>
+<file path=ppt/slides/slide6.xml><?xml version="1.0" encoding="utf-8"?>
 <p:sld xmlns:a="http://schemas.openxmlformats.org/drawingml/2006/main" xmlns:r="http://schemas.openxmlformats.org/officeDocument/2006/relationships" xmlns:p="http://schemas.openxmlformats.org/presentationml/2006/main">
   <p:cSld>
     <p:spTree>
@@ -4313,7 +4812,7 @@
           <a:p>
             <a:fld id="{272CAA4E-1DDD-451B-A02B-C4FCBD1FBAB6}" type="slidenum">
               <a:rPr lang="en-US" smtClean="0"/>
-              <a:t>5</a:t>
+              <a:t>6</a:t>
             </a:fld>
             <a:endParaRPr lang="en-US"/>
           </a:p>
@@ -4362,7 +4861,7 @@
 </p:sld>
 </file>
 
-<file path=ppt/slides/slide6.xml><?xml version="1.0" encoding="utf-8"?>
+<file path=ppt/slides/slide7.xml><?xml version="1.0" encoding="utf-8"?>
 <p:sld xmlns:a="http://schemas.openxmlformats.org/drawingml/2006/main" xmlns:r="http://schemas.openxmlformats.org/officeDocument/2006/relationships" xmlns:p="http://schemas.openxmlformats.org/presentationml/2006/main">
   <p:cSld>
     <p:spTree>
@@ -4430,7 +4929,7 @@
           <a:p>
             <a:fld id="{272CAA4E-1DDD-451B-A02B-C4FCBD1FBAB6}" type="slidenum">
               <a:rPr lang="en-US" smtClean="0"/>
-              <a:t>6</a:t>
+              <a:t>7</a:t>
             </a:fld>
             <a:endParaRPr lang="en-US"/>
           </a:p>
@@ -4479,7 +4978,7 @@
 </p:sld>
 </file>
 
-<file path=ppt/slides/slide7.xml><?xml version="1.0" encoding="utf-8"?>
+<file path=ppt/slides/slide8.xml><?xml version="1.0" encoding="utf-8"?>
 <p:sld xmlns:a="http://schemas.openxmlformats.org/drawingml/2006/main" xmlns:r="http://schemas.openxmlformats.org/officeDocument/2006/relationships" xmlns:p="http://schemas.openxmlformats.org/presentationml/2006/main">
   <p:cSld>
     <p:spTree>
@@ -4547,7 +5046,7 @@
           <a:p>
             <a:fld id="{272CAA4E-1DDD-451B-A02B-C4FCBD1FBAB6}" type="slidenum">
               <a:rPr lang="en-US" smtClean="0"/>
-              <a:t>7</a:t>
+              <a:t>8</a:t>
             </a:fld>
             <a:endParaRPr lang="en-US"/>
           </a:p>
@@ -4596,7 +5095,7 @@
 </p:sld>
 </file>
 
-<file path=ppt/slides/slide8.xml><?xml version="1.0" encoding="utf-8"?>
+<file path=ppt/slides/slide9.xml><?xml version="1.0" encoding="utf-8"?>
 <p:sld xmlns:a="http://schemas.openxmlformats.org/drawingml/2006/main" xmlns:r="http://schemas.openxmlformats.org/officeDocument/2006/relationships" xmlns:p="http://schemas.openxmlformats.org/presentationml/2006/main">
   <p:cSld>
     <p:spTree>
@@ -4664,7 +5163,7 @@
           <a:p>
             <a:fld id="{272CAA4E-1DDD-451B-A02B-C4FCBD1FBAB6}" type="slidenum">
               <a:rPr lang="en-US" smtClean="0"/>
-              <a:t>8</a:t>
+              <a:t>9</a:t>
             </a:fld>
             <a:endParaRPr lang="en-US"/>
           </a:p>
@@ -4704,123 +5203,6 @@
     <p:extLst>
       <p:ext uri="{BB962C8B-B14F-4D97-AF65-F5344CB8AC3E}">
         <p14:creationId xmlns:p14="http://schemas.microsoft.com/office/powerpoint/2010/main" val="2501549981"/>
-      </p:ext>
-    </p:extLst>
-  </p:cSld>
-  <p:clrMapOvr>
-    <a:masterClrMapping/>
-  </p:clrMapOvr>
-</p:sld>
-</file>
-
-<file path=ppt/slides/slide9.xml><?xml version="1.0" encoding="utf-8"?>
-<p:sld xmlns:a="http://schemas.openxmlformats.org/drawingml/2006/main" xmlns:r="http://schemas.openxmlformats.org/officeDocument/2006/relationships" xmlns:p="http://schemas.openxmlformats.org/presentationml/2006/main">
-  <p:cSld>
-    <p:spTree>
-      <p:nvGrpSpPr>
-        <p:cNvPr id="1" name=""/>
-        <p:cNvGrpSpPr/>
-        <p:nvPr/>
-      </p:nvGrpSpPr>
-      <p:grpSpPr>
-        <a:xfrm>
-          <a:off x="0" y="0"/>
-          <a:ext cx="0" cy="0"/>
-          <a:chOff x="0" y="0"/>
-          <a:chExt cx="0" cy="0"/>
-        </a:xfrm>
-      </p:grpSpPr>
-      <p:sp>
-        <p:nvSpPr>
-          <p:cNvPr id="2" name="Title 1">
-            <a:extLst>
-              <a:ext uri="{FF2B5EF4-FFF2-40B4-BE49-F238E27FC236}">
-                <a16:creationId xmlns:a16="http://schemas.microsoft.com/office/drawing/2014/main" id="{C02741FD-9F10-4244-BF1E-B63E9B7FD562}"/>
-              </a:ext>
-            </a:extLst>
-          </p:cNvPr>
-          <p:cNvSpPr>
-            <a:spLocks noGrp="1"/>
-          </p:cNvSpPr>
-          <p:nvPr>
-            <p:ph type="title"/>
-          </p:nvPr>
-        </p:nvSpPr>
-        <p:spPr/>
-        <p:txBody>
-          <a:bodyPr/>
-          <a:lstStyle/>
-          <a:p>
-            <a:r>
-              <a:rPr lang="en-US" dirty="0"/>
-              <a:t>DPS UI – End-User Interface – Batch Process</a:t>
-            </a:r>
-          </a:p>
-        </p:txBody>
-      </p:sp>
-      <p:sp>
-        <p:nvSpPr>
-          <p:cNvPr id="5" name="Slide Number Placeholder 4">
-            <a:extLst>
-              <a:ext uri="{FF2B5EF4-FFF2-40B4-BE49-F238E27FC236}">
-                <a16:creationId xmlns:a16="http://schemas.microsoft.com/office/drawing/2014/main" id="{445AB3A0-5122-4EEB-A97B-D0F5BDBF509D}"/>
-              </a:ext>
-            </a:extLst>
-          </p:cNvPr>
-          <p:cNvSpPr>
-            <a:spLocks noGrp="1"/>
-          </p:cNvSpPr>
-          <p:nvPr>
-            <p:ph type="sldNum" sz="quarter" idx="12"/>
-          </p:nvPr>
-        </p:nvSpPr>
-        <p:spPr/>
-        <p:txBody>
-          <a:bodyPr/>
-          <a:lstStyle/>
-          <a:p>
-            <a:fld id="{272CAA4E-1DDD-451B-A02B-C4FCBD1FBAB6}" type="slidenum">
-              <a:rPr lang="en-US" smtClean="0"/>
-              <a:t>9</a:t>
-            </a:fld>
-            <a:endParaRPr lang="en-US"/>
-          </a:p>
-        </p:txBody>
-      </p:sp>
-      <p:pic>
-        <p:nvPicPr>
-          <p:cNvPr id="4" name="Picture 3">
-            <a:extLst>
-              <a:ext uri="{FF2B5EF4-FFF2-40B4-BE49-F238E27FC236}">
-                <a16:creationId xmlns:a16="http://schemas.microsoft.com/office/drawing/2014/main" id="{F07026C7-145F-4D4B-8DEB-659351E79E03}"/>
-              </a:ext>
-            </a:extLst>
-          </p:cNvPr>
-          <p:cNvPicPr>
-            <a:picLocks noChangeAspect="1"/>
-          </p:cNvPicPr>
-          <p:nvPr/>
-        </p:nvPicPr>
-        <p:blipFill>
-          <a:blip r:embed="rId2"/>
-          <a:stretch>
-            <a:fillRect/>
-          </a:stretch>
-        </p:blipFill>
-        <p:spPr>
-          <a:xfrm>
-            <a:off x="642957" y="2032514"/>
-            <a:ext cx="10906086" cy="3927653"/>
-          </a:xfrm>
-          <a:prstGeom prst="rect">
-            <a:avLst/>
-          </a:prstGeom>
-        </p:spPr>
-      </p:pic>
-    </p:spTree>
-    <p:extLst>
-      <p:ext uri="{BB962C8B-B14F-4D97-AF65-F5344CB8AC3E}">
-        <p14:creationId xmlns:p14="http://schemas.microsoft.com/office/powerpoint/2010/main" val="194762061"/>
       </p:ext>
     </p:extLst>
   </p:cSld>
@@ -5421,12 +5803,9 @@
 </file>
 
 <file path=customXml/item1.xml><?xml version="1.0" encoding="utf-8"?>
-<?mso-contentType ?>
-<FormTemplates xmlns="http://schemas.microsoft.com/sharepoint/v3/contenttype/forms">
-  <Display>DocumentLibraryForm</Display>
-  <Edit>DocumentLibraryForm</Edit>
-  <New>DocumentLibraryForm</New>
-</FormTemplates>
+<p:properties xmlns:p="http://schemas.microsoft.com/office/2006/metadata/properties" xmlns:xsi="http://www.w3.org/2001/XMLSchema-instance" xmlns:pc="http://schemas.microsoft.com/office/infopath/2007/PartnerControls">
+  <documentManagement/>
+</p:properties>
 </file>
 
 <file path=customXml/item2.xml><?xml version="1.0" encoding="utf-8"?>
@@ -5647,15 +6026,19 @@
 </file>
 
 <file path=customXml/item3.xml><?xml version="1.0" encoding="utf-8"?>
-<p:properties xmlns:p="http://schemas.microsoft.com/office/2006/metadata/properties" xmlns:xsi="http://www.w3.org/2001/XMLSchema-instance" xmlns:pc="http://schemas.microsoft.com/office/infopath/2007/PartnerControls">
-  <documentManagement/>
-</p:properties>
+<?mso-contentType ?>
+<FormTemplates xmlns="http://schemas.microsoft.com/sharepoint/v3/contenttype/forms">
+  <Display>DocumentLibraryForm</Display>
+  <Edit>DocumentLibraryForm</Edit>
+  <New>DocumentLibraryForm</New>
+</FormTemplates>
 </file>
 
 <file path=customXml/itemProps1.xml><?xml version="1.0" encoding="utf-8"?>
-<ds:datastoreItem xmlns:ds="http://schemas.openxmlformats.org/officeDocument/2006/customXml" ds:itemID="{40190B9D-9687-491A-95DB-7D8BEC579CF1}">
+<ds:datastoreItem xmlns:ds="http://schemas.openxmlformats.org/officeDocument/2006/customXml" ds:itemID="{5FCC2E16-3B17-4384-8F95-625D09B1AAA6}">
   <ds:schemaRefs>
-    <ds:schemaRef ds:uri="http://schemas.microsoft.com/sharepoint/v3/contenttype/forms"/>
+    <ds:schemaRef ds:uri="http://schemas.microsoft.com/office/2006/metadata/properties"/>
+    <ds:schemaRef ds:uri="http://schemas.microsoft.com/office/infopath/2007/PartnerControls"/>
   </ds:schemaRefs>
 </ds:datastoreItem>
 </file>
@@ -5680,10 +6063,9 @@
 </file>
 
 <file path=customXml/itemProps3.xml><?xml version="1.0" encoding="utf-8"?>
-<ds:datastoreItem xmlns:ds="http://schemas.openxmlformats.org/officeDocument/2006/customXml" ds:itemID="{5FCC2E16-3B17-4384-8F95-625D09B1AAA6}">
+<ds:datastoreItem xmlns:ds="http://schemas.openxmlformats.org/officeDocument/2006/customXml" ds:itemID="{40190B9D-9687-491A-95DB-7D8BEC579CF1}">
   <ds:schemaRefs>
-    <ds:schemaRef ds:uri="http://schemas.microsoft.com/office/2006/metadata/properties"/>
-    <ds:schemaRef ds:uri="http://schemas.microsoft.com/office/infopath/2007/PartnerControls"/>
+    <ds:schemaRef ds:uri="http://schemas.microsoft.com/sharepoint/v3/contenttype/forms"/>
   </ds:schemaRefs>
 </ds:datastoreItem>
 </file>
</xml_diff>